<commit_message>
Updated slides for F# talk at .NET Developer Days.
</commit_message>
<xml_diff>
--- a/F#/20141016 - .NET Developer Days/Kuba Waliński - F# - Dlaczego warto programować funkcyjnie.pptx
+++ b/F#/20141016 - .NET Developer Days/Kuba Waliński - F# - Dlaczego warto programować funkcyjnie.pptx
@@ -6868,34 +6868,41 @@
         </p:nvSpPr>
         <p:spPr/>
         <p:txBody>
-          <a:bodyPr/>
+          <a:bodyPr>
+            <a:normAutofit/>
+          </a:bodyPr>
           <a:lstStyle/>
+          <a:p>
+            <a:r>
+              <a:rPr lang="pl-PL" sz="2400" dirty="0" err="1" smtClean="0"/>
+              <a:t>Krotki</a:t>
+            </a:r>
+            <a:endParaRPr lang="pl-PL" sz="2400" dirty="0" smtClean="0"/>
+          </a:p>
+          <a:p>
+            <a:pPr lvl="1"/>
+            <a:r>
+              <a:rPr lang="pl-PL" sz="2000" dirty="0" smtClean="0"/>
+              <a:t>grupa wartości</a:t>
+            </a:r>
+          </a:p>
+          <a:p>
+            <a:pPr lvl="1"/>
+            <a:r>
+              <a:rPr lang="pl-PL" sz="2000" dirty="0" smtClean="0"/>
+              <a:t>mogą być różnych </a:t>
+            </a:r>
+            <a:r>
+              <a:rPr lang="pl-PL" sz="2000" dirty="0" smtClean="0"/>
+              <a:t>typów</a:t>
+            </a:r>
+          </a:p>
           <a:p>
             <a:r>
               <a:rPr lang="pl-PL" sz="2400" dirty="0" smtClean="0"/>
               <a:t>Listy</a:t>
             </a:r>
-          </a:p>
-          <a:p>
-            <a:r>
-              <a:rPr lang="pl-PL" sz="2400" dirty="0" err="1" smtClean="0"/>
-              <a:t>Krotki</a:t>
-            </a:r>
-            <a:endParaRPr lang="pl-PL" sz="2400" dirty="0" smtClean="0"/>
-          </a:p>
-          <a:p>
-            <a:pPr lvl="1"/>
-            <a:r>
-              <a:rPr lang="pl-PL" sz="2000" dirty="0" smtClean="0"/>
-              <a:t>grupa wartości</a:t>
-            </a:r>
-          </a:p>
-          <a:p>
-            <a:pPr lvl="1"/>
-            <a:r>
-              <a:rPr lang="pl-PL" sz="2000" dirty="0" smtClean="0"/>
-              <a:t>mogą być różnych typów</a:t>
-            </a:r>
+            <a:endParaRPr lang="pl-PL" sz="2150" dirty="0" smtClean="0"/>
           </a:p>
           <a:p>
             <a:r>

</xml_diff>